<commit_message>
Final ppt and ipynb versions
</commit_message>
<xml_diff>
--- a/word2vec_presentation.pptx
+++ b/word2vec_presentation.pptx
@@ -5,7 +5,7 @@
     <p:sldMasterId id="2147484419" r:id="rId1"/>
   </p:sldMasterIdLst>
   <p:notesMasterIdLst>
-    <p:notesMasterId r:id="rId22"/>
+    <p:notesMasterId r:id="rId23"/>
   </p:notesMasterIdLst>
   <p:sldIdLst>
     <p:sldId id="257" r:id="rId2"/>
@@ -22,12 +22,13 @@
     <p:sldId id="271" r:id="rId13"/>
     <p:sldId id="272" r:id="rId14"/>
     <p:sldId id="273" r:id="rId15"/>
-    <p:sldId id="274" r:id="rId16"/>
-    <p:sldId id="275" r:id="rId17"/>
-    <p:sldId id="277" r:id="rId18"/>
-    <p:sldId id="276" r:id="rId19"/>
-    <p:sldId id="279" r:id="rId20"/>
-    <p:sldId id="280" r:id="rId21"/>
+    <p:sldId id="275" r:id="rId16"/>
+    <p:sldId id="274" r:id="rId17"/>
+    <p:sldId id="281" r:id="rId18"/>
+    <p:sldId id="277" r:id="rId19"/>
+    <p:sldId id="276" r:id="rId20"/>
+    <p:sldId id="279" r:id="rId21"/>
+    <p:sldId id="280" r:id="rId22"/>
   </p:sldIdLst>
   <p:sldSz cx="12192000" cy="6858000"/>
   <p:notesSz cx="6858000" cy="9144000"/>
@@ -7021,7 +7022,7 @@
           <p:cNvPr id="2" name="Title 1">
             <a:extLst>
               <a:ext uri="{FF2B5EF4-FFF2-40B4-BE49-F238E27FC236}">
-                <a16:creationId xmlns:a16="http://schemas.microsoft.com/office/drawing/2014/main" id="{3DF01987-76E0-2E44-BA15-A980868883D5}"/>
+                <a16:creationId xmlns:a16="http://schemas.microsoft.com/office/drawing/2014/main" id="{ED673EF7-D3E4-B143-8197-51689486E12A}"/>
               </a:ext>
             </a:extLst>
           </p:cNvPr>
@@ -7034,16 +7035,19 @@
         </p:nvSpPr>
         <p:spPr>
           <a:xfrm>
-            <a:off x="963000" y="155121"/>
-            <a:ext cx="8616800" cy="1143200"/>
+            <a:off x="1559429" y="424063"/>
+            <a:ext cx="9073141" cy="1143200"/>
           </a:xfrm>
         </p:spPr>
         <p:txBody>
           <a:bodyPr/>
           <a:lstStyle/>
           <a:p>
+            <a:pPr algn="ctr"/>
             <a:r>
-              <a:rPr lang="en-US" dirty="0"/>
+              <a:rPr lang="en-US" sz="5400" dirty="0">
+                <a:latin typeface="+mj-lt"/>
+              </a:rPr>
               <a:t>word2vec Architecture</a:t>
             </a:r>
           </a:p>
@@ -7054,7 +7058,7 @@
           <p:cNvPr id="3" name="Text Placeholder 2">
             <a:extLst>
               <a:ext uri="{FF2B5EF4-FFF2-40B4-BE49-F238E27FC236}">
-                <a16:creationId xmlns:a16="http://schemas.microsoft.com/office/drawing/2014/main" id="{41A8E826-AED4-4146-A4E6-B61DC641AAB4}"/>
+                <a16:creationId xmlns:a16="http://schemas.microsoft.com/office/drawing/2014/main" id="{B708A034-1435-4642-A728-9A5CB6C0AA56}"/>
               </a:ext>
             </a:extLst>
           </p:cNvPr>
@@ -7065,7 +7069,12 @@
             <p:ph type="body" idx="1"/>
           </p:nvPr>
         </p:nvSpPr>
-        <p:spPr/>
+        <p:spPr>
+          <a:xfrm>
+            <a:off x="1787599" y="1670086"/>
+            <a:ext cx="8616800" cy="4736400"/>
+          </a:xfrm>
+        </p:spPr>
         <p:txBody>
           <a:bodyPr/>
           <a:lstStyle/>
@@ -7073,79 +7082,49 @@
             <a:pPr marL="152396" indent="0">
               <a:buNone/>
             </a:pPr>
-            <a:endParaRPr lang="en-US" dirty="0"/>
-          </a:p>
-        </p:txBody>
-      </p:sp>
-      <p:pic>
-        <p:nvPicPr>
-          <p:cNvPr id="4" name="Picture 3">
-            <a:extLst>
-              <a:ext uri="{FF2B5EF4-FFF2-40B4-BE49-F238E27FC236}">
-                <a16:creationId xmlns:a16="http://schemas.microsoft.com/office/drawing/2014/main" id="{2EA5030A-DF7B-9D45-86A5-817C77C1A6B7}"/>
-              </a:ext>
-            </a:extLst>
-          </p:cNvPr>
-          <p:cNvPicPr>
-            <a:picLocks noChangeAspect="1"/>
-          </p:cNvPicPr>
-          <p:nvPr/>
-        </p:nvPicPr>
-        <p:blipFill>
-          <a:blip r:embed="rId2"/>
-          <a:stretch>
-            <a:fillRect/>
-          </a:stretch>
-        </p:blipFill>
-        <p:spPr>
-          <a:xfrm>
-            <a:off x="2550105" y="1370815"/>
-            <a:ext cx="7091789" cy="5197036"/>
-          </a:xfrm>
-          <a:prstGeom prst="rect">
-            <a:avLst/>
-          </a:prstGeom>
-        </p:spPr>
-      </p:pic>
-      <p:sp>
-        <p:nvSpPr>
-          <p:cNvPr id="5" name="TextBox 4">
-            <a:extLst>
-              <a:ext uri="{FF2B5EF4-FFF2-40B4-BE49-F238E27FC236}">
-                <a16:creationId xmlns:a16="http://schemas.microsoft.com/office/drawing/2014/main" id="{DF0D5E89-D60D-054A-B872-51BB8AE30A85}"/>
-              </a:ext>
-            </a:extLst>
-          </p:cNvPr>
-          <p:cNvSpPr txBox="1"/>
-          <p:nvPr/>
-        </p:nvSpPr>
-        <p:spPr>
-          <a:xfrm>
-            <a:off x="1344706" y="6383185"/>
-            <a:ext cx="7301999" cy="369332"/>
-          </a:xfrm>
-          <a:prstGeom prst="rect">
-            <a:avLst/>
-          </a:prstGeom>
-          <a:noFill/>
-        </p:spPr>
-        <p:txBody>
-          <a:bodyPr wrap="none" rtlCol="0">
-            <a:spAutoFit/>
-          </a:bodyPr>
-          <a:lstStyle/>
-          <a:p>
             <a:r>
-              <a:rPr lang="en-US" dirty="0"/>
-              <a:t>http://</a:t>
+              <a:rPr lang="en-US" sz="3200" dirty="0">
+                <a:latin typeface="+mn-lt"/>
+              </a:rPr>
+              <a:t>2 Flavors:</a:t>
             </a:r>
+          </a:p>
+          <a:p>
+            <a:pPr marL="152396" indent="0">
+              <a:buNone/>
+            </a:pPr>
+            <a:endParaRPr lang="en-US" sz="3200" dirty="0">
+              <a:latin typeface="+mn-lt"/>
+            </a:endParaRPr>
+          </a:p>
+          <a:p>
+            <a:pPr marL="152396" indent="0">
+              <a:buNone/>
+            </a:pPr>
             <a:r>
-              <a:rPr lang="en-US" dirty="0" err="1"/>
-              <a:t>mbenhaddou.com</a:t>
+              <a:rPr lang="en-US" sz="3200" dirty="0">
+                <a:latin typeface="+mn-lt"/>
+              </a:rPr>
+              <a:t>Continuous Bag of Words: predict word vector from context vector</a:t>
             </a:r>
+          </a:p>
+          <a:p>
+            <a:pPr marL="152396" indent="0">
+              <a:buNone/>
+            </a:pPr>
+            <a:endParaRPr lang="en-US" sz="3200" dirty="0">
+              <a:latin typeface="+mn-lt"/>
+            </a:endParaRPr>
+          </a:p>
+          <a:p>
+            <a:pPr marL="152396" indent="0">
+              <a:buNone/>
+            </a:pPr>
             <a:r>
-              <a:rPr lang="en-US" dirty="0"/>
-              <a:t>/2019/12/14/word2vec-concepts-from-scratch/</a:t>
+              <a:rPr lang="en-US" sz="3200" dirty="0">
+                <a:latin typeface="+mn-lt"/>
+              </a:rPr>
+              <a:t>Skip-gram: predict context vector from word vector</a:t>
             </a:r>
           </a:p>
         </p:txBody>
@@ -7153,7 +7132,7 @@
     </p:spTree>
     <p:extLst>
       <p:ext uri="{BB962C8B-B14F-4D97-AF65-F5344CB8AC3E}">
-        <p14:creationId xmlns:p14="http://schemas.microsoft.com/office/powerpoint/2010/main" val="2018354539"/>
+        <p14:creationId xmlns:p14="http://schemas.microsoft.com/office/powerpoint/2010/main" val="2286962497"/>
       </p:ext>
     </p:extLst>
   </p:cSld>
@@ -7185,7 +7164,7 @@
           <p:cNvPr id="2" name="Title 1">
             <a:extLst>
               <a:ext uri="{FF2B5EF4-FFF2-40B4-BE49-F238E27FC236}">
-                <a16:creationId xmlns:a16="http://schemas.microsoft.com/office/drawing/2014/main" id="{ED673EF7-D3E4-B143-8197-51689486E12A}"/>
+                <a16:creationId xmlns:a16="http://schemas.microsoft.com/office/drawing/2014/main" id="{3DF01987-76E0-2E44-BA15-A980868883D5}"/>
               </a:ext>
             </a:extLst>
           </p:cNvPr>
@@ -7198,19 +7177,16 @@
         </p:nvSpPr>
         <p:spPr>
           <a:xfrm>
-            <a:off x="1559429" y="424063"/>
-            <a:ext cx="9073141" cy="1143200"/>
+            <a:off x="963000" y="155121"/>
+            <a:ext cx="8616800" cy="1143200"/>
           </a:xfrm>
         </p:spPr>
         <p:txBody>
           <a:bodyPr/>
           <a:lstStyle/>
           <a:p>
-            <a:pPr algn="ctr"/>
             <a:r>
-              <a:rPr lang="en-US" sz="5400" dirty="0">
-                <a:latin typeface="+mj-lt"/>
-              </a:rPr>
+              <a:rPr lang="en-US" dirty="0"/>
               <a:t>word2vec Architecture</a:t>
             </a:r>
           </a:p>
@@ -7221,7 +7197,7 @@
           <p:cNvPr id="3" name="Text Placeholder 2">
             <a:extLst>
               <a:ext uri="{FF2B5EF4-FFF2-40B4-BE49-F238E27FC236}">
-                <a16:creationId xmlns:a16="http://schemas.microsoft.com/office/drawing/2014/main" id="{B708A034-1435-4642-A728-9A5CB6C0AA56}"/>
+                <a16:creationId xmlns:a16="http://schemas.microsoft.com/office/drawing/2014/main" id="{41A8E826-AED4-4146-A4E6-B61DC641AAB4}"/>
               </a:ext>
             </a:extLst>
           </p:cNvPr>
@@ -7232,12 +7208,7 @@
             <p:ph type="body" idx="1"/>
           </p:nvPr>
         </p:nvSpPr>
-        <p:spPr>
-          <a:xfrm>
-            <a:off x="1787599" y="1670086"/>
-            <a:ext cx="8616800" cy="4736400"/>
-          </a:xfrm>
-        </p:spPr>
+        <p:spPr/>
         <p:txBody>
           <a:bodyPr/>
           <a:lstStyle/>
@@ -7245,49 +7216,79 @@
             <a:pPr marL="152396" indent="0">
               <a:buNone/>
             </a:pPr>
+            <a:endParaRPr lang="en-US" dirty="0"/>
+          </a:p>
+        </p:txBody>
+      </p:sp>
+      <p:pic>
+        <p:nvPicPr>
+          <p:cNvPr id="4" name="Picture 3">
+            <a:extLst>
+              <a:ext uri="{FF2B5EF4-FFF2-40B4-BE49-F238E27FC236}">
+                <a16:creationId xmlns:a16="http://schemas.microsoft.com/office/drawing/2014/main" id="{2EA5030A-DF7B-9D45-86A5-817C77C1A6B7}"/>
+              </a:ext>
+            </a:extLst>
+          </p:cNvPr>
+          <p:cNvPicPr>
+            <a:picLocks noChangeAspect="1"/>
+          </p:cNvPicPr>
+          <p:nvPr/>
+        </p:nvPicPr>
+        <p:blipFill>
+          <a:blip r:embed="rId2"/>
+          <a:stretch>
+            <a:fillRect/>
+          </a:stretch>
+        </p:blipFill>
+        <p:spPr>
+          <a:xfrm>
+            <a:off x="1954105" y="1370815"/>
+            <a:ext cx="7091789" cy="5197036"/>
+          </a:xfrm>
+          <a:prstGeom prst="rect">
+            <a:avLst/>
+          </a:prstGeom>
+        </p:spPr>
+      </p:pic>
+      <p:sp>
+        <p:nvSpPr>
+          <p:cNvPr id="5" name="TextBox 4">
+            <a:extLst>
+              <a:ext uri="{FF2B5EF4-FFF2-40B4-BE49-F238E27FC236}">
+                <a16:creationId xmlns:a16="http://schemas.microsoft.com/office/drawing/2014/main" id="{DF0D5E89-D60D-054A-B872-51BB8AE30A85}"/>
+              </a:ext>
+            </a:extLst>
+          </p:cNvPr>
+          <p:cNvSpPr txBox="1"/>
+          <p:nvPr/>
+        </p:nvSpPr>
+        <p:spPr>
+          <a:xfrm>
+            <a:off x="1344706" y="6383185"/>
+            <a:ext cx="7301999" cy="369332"/>
+          </a:xfrm>
+          <a:prstGeom prst="rect">
+            <a:avLst/>
+          </a:prstGeom>
+          <a:noFill/>
+        </p:spPr>
+        <p:txBody>
+          <a:bodyPr wrap="none" rtlCol="0">
+            <a:spAutoFit/>
+          </a:bodyPr>
+          <a:lstStyle/>
+          <a:p>
             <a:r>
-              <a:rPr lang="en-US" sz="3200" dirty="0">
-                <a:latin typeface="+mn-lt"/>
-              </a:rPr>
-              <a:t>2 Flavors:</a:t>
+              <a:rPr lang="en-US" dirty="0"/>
+              <a:t>http://</a:t>
             </a:r>
-          </a:p>
-          <a:p>
-            <a:pPr marL="152396" indent="0">
-              <a:buNone/>
-            </a:pPr>
-            <a:endParaRPr lang="en-US" sz="3200" dirty="0">
-              <a:latin typeface="+mn-lt"/>
-            </a:endParaRPr>
-          </a:p>
-          <a:p>
-            <a:pPr marL="152396" indent="0">
-              <a:buNone/>
-            </a:pPr>
             <a:r>
-              <a:rPr lang="en-US" sz="3200" dirty="0">
-                <a:latin typeface="+mn-lt"/>
-              </a:rPr>
-              <a:t>Continuous Bag of Words: predict word vector from context vector</a:t>
+              <a:rPr lang="en-US" dirty="0" err="1"/>
+              <a:t>mbenhaddou.com</a:t>
             </a:r>
-          </a:p>
-          <a:p>
-            <a:pPr marL="152396" indent="0">
-              <a:buNone/>
-            </a:pPr>
-            <a:endParaRPr lang="en-US" sz="3200" dirty="0">
-              <a:latin typeface="+mn-lt"/>
-            </a:endParaRPr>
-          </a:p>
-          <a:p>
-            <a:pPr marL="152396" indent="0">
-              <a:buNone/>
-            </a:pPr>
             <a:r>
-              <a:rPr lang="en-US" sz="3200" dirty="0">
-                <a:latin typeface="+mn-lt"/>
-              </a:rPr>
-              <a:t>Skip-gram: predict context vector from word vector</a:t>
+              <a:rPr lang="en-US" dirty="0"/>
+              <a:t>/2019/12/14/word2vec-concepts-from-scratch/</a:t>
             </a:r>
           </a:p>
         </p:txBody>
@@ -7295,7 +7296,7 @@
     </p:spTree>
     <p:extLst>
       <p:ext uri="{BB962C8B-B14F-4D97-AF65-F5344CB8AC3E}">
-        <p14:creationId xmlns:p14="http://schemas.microsoft.com/office/powerpoint/2010/main" val="2286962497"/>
+        <p14:creationId xmlns:p14="http://schemas.microsoft.com/office/powerpoint/2010/main" val="2018354539"/>
       </p:ext>
     </p:extLst>
   </p:cSld>
@@ -7322,6 +7323,485 @@
           <a:chExt cx="0" cy="0"/>
         </a:xfrm>
       </p:grpSpPr>
+      <mc:AlternateContent xmlns:mc="http://schemas.openxmlformats.org/markup-compatibility/2006">
+        <mc:Choice xmlns:a14="http://schemas.microsoft.com/office/drawing/2010/main" Requires="a14">
+          <p:sp>
+            <p:nvSpPr>
+              <p:cNvPr id="3" name="Text Placeholder 2">
+                <a:extLst>
+                  <a:ext uri="{FF2B5EF4-FFF2-40B4-BE49-F238E27FC236}">
+                    <a16:creationId xmlns:a16="http://schemas.microsoft.com/office/drawing/2014/main" id="{D16D81CC-6F27-604C-ADE9-C06C21DB3742}"/>
+                  </a:ext>
+                </a:extLst>
+              </p:cNvPr>
+              <p:cNvSpPr>
+                <a:spLocks noGrp="1"/>
+              </p:cNvSpPr>
+              <p:nvPr>
+                <p:ph type="body" idx="1"/>
+              </p:nvPr>
+            </p:nvSpPr>
+            <p:spPr>
+              <a:xfrm>
+                <a:off x="481653" y="698331"/>
+                <a:ext cx="10036694" cy="5537537"/>
+              </a:xfrm>
+            </p:spPr>
+            <p:txBody>
+              <a:bodyPr/>
+              <a:lstStyle/>
+              <a:p>
+                <a:pPr marL="152396" indent="0">
+                  <a:buNone/>
+                </a:pPr>
+                <a:r>
+                  <a:rPr lang="en-US" sz="3600" dirty="0"/>
+                  <a:t>Inference:</a:t>
+                </a:r>
+              </a:p>
+              <a:p>
+                <a:pPr marL="152396" indent="0">
+                  <a:buNone/>
+                </a:pPr>
+                <a:r>
+                  <a:rPr lang="en-US" sz="3600" b="0" dirty="0"/>
+                  <a:t>Skip-gram:       </a:t>
+                </a:r>
+                <a14:m>
+                  <m:oMath xmlns:m="http://schemas.openxmlformats.org/officeDocument/2006/math">
+                    <m:sSub>
+                      <m:sSubPr>
+                        <m:ctrlPr>
+                          <a:rPr lang="en-US" sz="3600" b="0" i="1" smtClean="0">
+                            <a:latin typeface="Cambria Math" panose="02040503050406030204" pitchFamily="18" charset="0"/>
+                          </a:rPr>
+                        </m:ctrlPr>
+                      </m:sSubPr>
+                      <m:e>
+                        <m:r>
+                          <a:rPr lang="en-US" sz="3600" b="0" i="1" smtClean="0">
+                            <a:latin typeface="Cambria Math" panose="02040503050406030204" pitchFamily="18" charset="0"/>
+                          </a:rPr>
+                          <m:t>𝐴𝑟𝑔𝑚𝑖𝑛</m:t>
+                        </m:r>
+                      </m:e>
+                      <m:sub>
+                        <m:r>
+                          <a:rPr lang="en-US" sz="3600" b="0" i="1" smtClean="0">
+                            <a:latin typeface="Cambria Math" panose="02040503050406030204" pitchFamily="18" charset="0"/>
+                          </a:rPr>
+                          <m:t>𝑊</m:t>
+                        </m:r>
+                        <m:sSup>
+                          <m:sSupPr>
+                            <m:ctrlPr>
+                              <a:rPr lang="en-US" sz="3600" b="0" i="1" smtClean="0">
+                                <a:latin typeface="Cambria Math" panose="02040503050406030204" pitchFamily="18" charset="0"/>
+                              </a:rPr>
+                            </m:ctrlPr>
+                          </m:sSupPr>
+                          <m:e>
+                            <m:r>
+                              <a:rPr lang="en-US" sz="3600" b="0" i="1" smtClean="0">
+                                <a:latin typeface="Cambria Math" panose="02040503050406030204" pitchFamily="18" charset="0"/>
+                              </a:rPr>
+                              <m:t>𝑊</m:t>
+                            </m:r>
+                          </m:e>
+                          <m:sup>
+                            <m:r>
+                              <a:rPr lang="en-US" sz="3600" b="0" i="1" smtClean="0">
+                                <a:latin typeface="Cambria Math" panose="02040503050406030204" pitchFamily="18" charset="0"/>
+                              </a:rPr>
+                              <m:t>′</m:t>
+                            </m:r>
+                          </m:sup>
+                        </m:sSup>
+                      </m:sub>
+                    </m:sSub>
+                    <m:r>
+                      <a:rPr lang="en-US" sz="3600" b="0" i="1" smtClean="0">
+                        <a:latin typeface="Cambria Math" panose="02040503050406030204" pitchFamily="18" charset="0"/>
+                      </a:rPr>
+                      <m:t>(</m:t>
+                    </m:r>
+                    <m:r>
+                      <a:rPr lang="en-US" sz="3600" b="0" i="1" smtClean="0">
+                        <a:latin typeface="Cambria Math" panose="02040503050406030204" pitchFamily="18" charset="0"/>
+                      </a:rPr>
+                      <m:t>𝑙𝑜𝑠𝑠</m:t>
+                    </m:r>
+                    <m:r>
+                      <a:rPr lang="en-US" sz="3600" b="0" i="1" smtClean="0">
+                        <a:latin typeface="Cambria Math" panose="02040503050406030204" pitchFamily="18" charset="0"/>
+                      </a:rPr>
+                      <m:t>(</m:t>
+                    </m:r>
+                    <m:r>
+                      <a:rPr lang="en-US" sz="3600" b="0" i="1" smtClean="0">
+                        <a:latin typeface="Cambria Math" panose="02040503050406030204" pitchFamily="18" charset="0"/>
+                      </a:rPr>
+                      <m:t>𝑐</m:t>
+                    </m:r>
+                    <m:r>
+                      <a:rPr lang="en-US" sz="3600" b="0" i="1" smtClean="0">
+                        <a:latin typeface="Cambria Math" panose="02040503050406030204" pitchFamily="18" charset="0"/>
+                      </a:rPr>
+                      <m:t>, </m:t>
+                    </m:r>
+                    <m:sSup>
+                      <m:sSupPr>
+                        <m:ctrlPr>
+                          <a:rPr lang="en-US" sz="3600" b="0" i="1" smtClean="0">
+                            <a:latin typeface="Cambria Math" panose="02040503050406030204" pitchFamily="18" charset="0"/>
+                          </a:rPr>
+                        </m:ctrlPr>
+                      </m:sSupPr>
+                      <m:e>
+                        <m:r>
+                          <a:rPr lang="en-US" sz="3600" b="0" i="1" smtClean="0">
+                            <a:latin typeface="Cambria Math" panose="02040503050406030204" pitchFamily="18" charset="0"/>
+                          </a:rPr>
+                          <m:t> </m:t>
+                        </m:r>
+                        <m:r>
+                          <a:rPr lang="en-US" sz="3600" b="0" i="1" smtClean="0">
+                            <a:latin typeface="Cambria Math" panose="02040503050406030204" pitchFamily="18" charset="0"/>
+                          </a:rPr>
+                          <m:t>𝑊</m:t>
+                        </m:r>
+                      </m:e>
+                      <m:sup>
+                        <m:r>
+                          <a:rPr lang="en-US" sz="3600" b="0" i="1" smtClean="0">
+                            <a:latin typeface="Cambria Math" panose="02040503050406030204" pitchFamily="18" charset="0"/>
+                          </a:rPr>
+                          <m:t>′</m:t>
+                        </m:r>
+                      </m:sup>
+                    </m:sSup>
+                    <m:r>
+                      <a:rPr lang="en-US" sz="3600" b="0" i="1" smtClean="0">
+                        <a:latin typeface="Cambria Math" panose="02040503050406030204" pitchFamily="18" charset="0"/>
+                      </a:rPr>
+                      <m:t>𝑊𝑤</m:t>
+                    </m:r>
+                  </m:oMath>
+                </a14:m>
+                <a:r>
+                  <a:rPr lang="en-US" sz="3600" dirty="0"/>
+                  <a:t>))</a:t>
+                </a:r>
+              </a:p>
+              <a:p>
+                <a:pPr marL="152396" indent="0">
+                  <a:buNone/>
+                </a:pPr>
+                <a:r>
+                  <a:rPr lang="en-US" sz="3600" dirty="0"/>
+                  <a:t>CBOW:	</a:t>
+                </a:r>
+                <a14:m>
+                  <m:oMath xmlns:m="http://schemas.openxmlformats.org/officeDocument/2006/math">
+                    <m:sSub>
+                      <m:sSubPr>
+                        <m:ctrlPr>
+                          <a:rPr lang="en-US" sz="3600" i="1">
+                            <a:latin typeface="Cambria Math" panose="02040503050406030204" pitchFamily="18" charset="0"/>
+                          </a:rPr>
+                        </m:ctrlPr>
+                      </m:sSubPr>
+                      <m:e>
+                        <m:r>
+                          <a:rPr lang="en-US" sz="3600" i="1">
+                            <a:latin typeface="Cambria Math" panose="02040503050406030204" pitchFamily="18" charset="0"/>
+                          </a:rPr>
+                          <m:t>𝐴𝑟𝑔𝑚𝑖𝑛</m:t>
+                        </m:r>
+                      </m:e>
+                      <m:sub>
+                        <m:r>
+                          <a:rPr lang="en-US" sz="3600" i="1">
+                            <a:latin typeface="Cambria Math" panose="02040503050406030204" pitchFamily="18" charset="0"/>
+                          </a:rPr>
+                          <m:t>𝑊</m:t>
+                        </m:r>
+                        <m:sSup>
+                          <m:sSupPr>
+                            <m:ctrlPr>
+                              <a:rPr lang="en-US" sz="3600" i="1">
+                                <a:latin typeface="Cambria Math" panose="02040503050406030204" pitchFamily="18" charset="0"/>
+                              </a:rPr>
+                            </m:ctrlPr>
+                          </m:sSupPr>
+                          <m:e>
+                            <m:r>
+                              <a:rPr lang="en-US" sz="3600" i="1">
+                                <a:latin typeface="Cambria Math" panose="02040503050406030204" pitchFamily="18" charset="0"/>
+                              </a:rPr>
+                              <m:t>𝑊</m:t>
+                            </m:r>
+                          </m:e>
+                          <m:sup>
+                            <m:r>
+                              <a:rPr lang="en-US" sz="3600" i="1">
+                                <a:latin typeface="Cambria Math" panose="02040503050406030204" pitchFamily="18" charset="0"/>
+                              </a:rPr>
+                              <m:t>′</m:t>
+                            </m:r>
+                          </m:sup>
+                        </m:sSup>
+                      </m:sub>
+                    </m:sSub>
+                    <m:r>
+                      <a:rPr lang="en-US" sz="3600" i="1">
+                        <a:latin typeface="Cambria Math" panose="02040503050406030204" pitchFamily="18" charset="0"/>
+                      </a:rPr>
+                      <m:t>(</m:t>
+                    </m:r>
+                    <m:r>
+                      <a:rPr lang="en-US" sz="3600" i="1">
+                        <a:latin typeface="Cambria Math" panose="02040503050406030204" pitchFamily="18" charset="0"/>
+                      </a:rPr>
+                      <m:t>𝑙𝑜𝑠𝑠</m:t>
+                    </m:r>
+                    <m:r>
+                      <a:rPr lang="en-US" sz="3600" i="1">
+                        <a:latin typeface="Cambria Math" panose="02040503050406030204" pitchFamily="18" charset="0"/>
+                      </a:rPr>
+                      <m:t>(</m:t>
+                    </m:r>
+                    <m:sSup>
+                      <m:sSupPr>
+                        <m:ctrlPr>
+                          <a:rPr lang="en-US" sz="3600" b="0" i="1" smtClean="0">
+                            <a:latin typeface="Cambria Math" panose="02040503050406030204" pitchFamily="18" charset="0"/>
+                          </a:rPr>
+                        </m:ctrlPr>
+                      </m:sSupPr>
+                      <m:e>
+                        <m:r>
+                          <a:rPr lang="en-US" sz="3600" b="0" i="1" smtClean="0">
+                            <a:latin typeface="Cambria Math" panose="02040503050406030204" pitchFamily="18" charset="0"/>
+                          </a:rPr>
+                          <m:t>𝑊</m:t>
+                        </m:r>
+                      </m:e>
+                      <m:sup>
+                        <m:r>
+                          <a:rPr lang="en-US" sz="3600" b="0" i="1" smtClean="0">
+                            <a:latin typeface="Cambria Math" panose="02040503050406030204" pitchFamily="18" charset="0"/>
+                          </a:rPr>
+                          <m:t>′</m:t>
+                        </m:r>
+                      </m:sup>
+                    </m:sSup>
+                    <m:r>
+                      <a:rPr lang="en-US" sz="3600" b="0" i="1" smtClean="0">
+                        <a:latin typeface="Cambria Math" panose="02040503050406030204" pitchFamily="18" charset="0"/>
+                      </a:rPr>
+                      <m:t>𝑊</m:t>
+                    </m:r>
+                    <m:r>
+                      <a:rPr lang="en-US" sz="3600" i="1">
+                        <a:latin typeface="Cambria Math" panose="02040503050406030204" pitchFamily="18" charset="0"/>
+                      </a:rPr>
+                      <m:t>𝑐</m:t>
+                    </m:r>
+                    <m:r>
+                      <a:rPr lang="en-US" sz="3600" i="1">
+                        <a:latin typeface="Cambria Math" panose="02040503050406030204" pitchFamily="18" charset="0"/>
+                      </a:rPr>
+                      <m:t>,  </m:t>
+                    </m:r>
+                    <m:r>
+                      <a:rPr lang="en-US" sz="3600" i="1">
+                        <a:latin typeface="Cambria Math" panose="02040503050406030204" pitchFamily="18" charset="0"/>
+                      </a:rPr>
+                      <m:t>𝑤</m:t>
+                    </m:r>
+                  </m:oMath>
+                </a14:m>
+                <a:r>
+                  <a:rPr lang="en-US" sz="3600" dirty="0"/>
+                  <a:t>))</a:t>
+                </a:r>
+              </a:p>
+              <a:p>
+                <a:pPr marL="152396" indent="0">
+                  <a:buNone/>
+                </a:pPr>
+                <a:endParaRPr lang="en-US" sz="3600" dirty="0"/>
+              </a:p>
+              <a:p>
+                <a:pPr marL="152396" indent="0">
+                  <a:buNone/>
+                </a:pPr>
+                <a:r>
+                  <a:rPr lang="en-US" sz="3600" dirty="0"/>
+                  <a:t>Embedding</a:t>
+                </a:r>
+              </a:p>
+              <a:p>
+                <a:pPr marL="152396" indent="0">
+                  <a:buNone/>
+                </a:pPr>
+                <a:r>
+                  <a:rPr lang="en-US" sz="3600" dirty="0"/>
+                  <a:t>Skip-gram:	</a:t>
+                </a:r>
+                <a14:m>
+                  <m:oMath xmlns:m="http://schemas.openxmlformats.org/officeDocument/2006/math">
+                    <m:r>
+                      <a:rPr lang="en-US" sz="3600" b="0" i="1" smtClean="0">
+                        <a:latin typeface="Cambria Math" panose="02040503050406030204" pitchFamily="18" charset="0"/>
+                      </a:rPr>
+                      <m:t>𝑒</m:t>
+                    </m:r>
+                    <m:r>
+                      <a:rPr lang="en-US" sz="3600" b="0" i="1" smtClean="0">
+                        <a:latin typeface="Cambria Math" panose="02040503050406030204" pitchFamily="18" charset="0"/>
+                      </a:rPr>
+                      <m:t>=</m:t>
+                    </m:r>
+                    <m:r>
+                      <a:rPr lang="en-US" sz="3600" b="0" i="1" smtClean="0">
+                        <a:latin typeface="Cambria Math" panose="02040503050406030204" pitchFamily="18" charset="0"/>
+                      </a:rPr>
+                      <m:t>𝑊𝑤</m:t>
+                    </m:r>
+                  </m:oMath>
+                </a14:m>
+                <a:endParaRPr lang="en-US" sz="3600" b="0" dirty="0"/>
+              </a:p>
+              <a:p>
+                <a:pPr marL="152396" indent="0">
+                  <a:buNone/>
+                </a:pPr>
+                <a:r>
+                  <a:rPr lang="en-US" sz="3600" dirty="0"/>
+                  <a:t>CBOW:	e = </a:t>
+                </a:r>
+                <a14:m>
+                  <m:oMath xmlns:m="http://schemas.openxmlformats.org/officeDocument/2006/math">
+                    <m:sSup>
+                      <m:sSupPr>
+                        <m:ctrlPr>
+                          <a:rPr lang="en-US" sz="3600" i="1" smtClean="0">
+                            <a:latin typeface="Cambria Math" panose="02040503050406030204" pitchFamily="18" charset="0"/>
+                          </a:rPr>
+                        </m:ctrlPr>
+                      </m:sSupPr>
+                      <m:e>
+                        <m:r>
+                          <a:rPr lang="en-US" sz="3600" b="0" i="1" smtClean="0">
+                            <a:latin typeface="Cambria Math" panose="02040503050406030204" pitchFamily="18" charset="0"/>
+                          </a:rPr>
+                          <m:t>𝑊</m:t>
+                        </m:r>
+                        <m:r>
+                          <a:rPr lang="en-US" sz="3600" b="0" i="1" smtClean="0">
+                            <a:latin typeface="Cambria Math" panose="02040503050406030204" pitchFamily="18" charset="0"/>
+                          </a:rPr>
+                          <m:t>′</m:t>
+                        </m:r>
+                      </m:e>
+                      <m:sup>
+                        <m:r>
+                          <a:rPr lang="en-US" sz="3600" b="0" i="1" smtClean="0">
+                            <a:latin typeface="Cambria Math" panose="02040503050406030204" pitchFamily="18" charset="0"/>
+                          </a:rPr>
+                          <m:t>−1</m:t>
+                        </m:r>
+                      </m:sup>
+                    </m:sSup>
+                    <m:r>
+                      <a:rPr lang="en-US" sz="3600" b="0" i="1" smtClean="0">
+                        <a:latin typeface="Cambria Math" panose="02040503050406030204" pitchFamily="18" charset="0"/>
+                      </a:rPr>
+                      <m:t>𝑤</m:t>
+                    </m:r>
+                  </m:oMath>
+                </a14:m>
+                <a:endParaRPr lang="en-US" sz="3600" dirty="0"/>
+              </a:p>
+            </p:txBody>
+          </p:sp>
+        </mc:Choice>
+        <mc:Fallback>
+          <p:sp>
+            <p:nvSpPr>
+              <p:cNvPr id="3" name="Text Placeholder 2">
+                <a:extLst>
+                  <a:ext uri="{FF2B5EF4-FFF2-40B4-BE49-F238E27FC236}">
+                    <a16:creationId xmlns:a16="http://schemas.microsoft.com/office/drawing/2014/main" id="{D16D81CC-6F27-604C-ADE9-C06C21DB3742}"/>
+                  </a:ext>
+                </a:extLst>
+              </p:cNvPr>
+              <p:cNvSpPr>
+                <a:spLocks noGrp="1" noRot="1" noChangeAspect="1" noMove="1" noResize="1" noEditPoints="1" noAdjustHandles="1" noChangeArrowheads="1" noChangeShapeType="1" noTextEdit="1"/>
+              </p:cNvSpPr>
+              <p:nvPr>
+                <p:ph type="body" idx="1"/>
+              </p:nvPr>
+            </p:nvSpPr>
+            <p:spPr>
+              <a:xfrm>
+                <a:off x="481653" y="698331"/>
+                <a:ext cx="10036694" cy="5537537"/>
+              </a:xfrm>
+              <a:blipFill>
+                <a:blip r:embed="rId2"/>
+                <a:stretch>
+                  <a:fillRect l="-253"/>
+                </a:stretch>
+              </a:blipFill>
+            </p:spPr>
+            <p:txBody>
+              <a:bodyPr/>
+              <a:lstStyle/>
+              <a:p>
+                <a:r>
+                  <a:rPr lang="en-US">
+                    <a:noFill/>
+                  </a:rPr>
+                  <a:t> </a:t>
+                </a:r>
+              </a:p>
+            </p:txBody>
+          </p:sp>
+        </mc:Fallback>
+      </mc:AlternateContent>
+    </p:spTree>
+    <p:extLst>
+      <p:ext uri="{BB962C8B-B14F-4D97-AF65-F5344CB8AC3E}">
+        <p14:creationId xmlns:p14="http://schemas.microsoft.com/office/powerpoint/2010/main" val="2835475726"/>
+      </p:ext>
+    </p:extLst>
+  </p:cSld>
+  <p:clrMapOvr>
+    <a:masterClrMapping/>
+  </p:clrMapOvr>
+</p:sld>
+</file>
+
+<file path=ppt/slides/slide18.xml><?xml version="1.0" encoding="utf-8"?>
+<p:sld xmlns:a="http://schemas.openxmlformats.org/drawingml/2006/main" xmlns:r="http://schemas.openxmlformats.org/officeDocument/2006/relationships" xmlns:p="http://schemas.openxmlformats.org/presentationml/2006/main">
+  <p:cSld>
+    <p:spTree>
+      <p:nvGrpSpPr>
+        <p:cNvPr id="1" name=""/>
+        <p:cNvGrpSpPr/>
+        <p:nvPr/>
+      </p:nvGrpSpPr>
+      <p:grpSpPr>
+        <a:xfrm>
+          <a:off x="0" y="0"/>
+          <a:ext cx="0" cy="0"/>
+          <a:chOff x="0" y="0"/>
+          <a:chExt cx="0" cy="0"/>
+        </a:xfrm>
+      </p:grpSpPr>
       <p:sp>
         <p:nvSpPr>
           <p:cNvPr id="4" name="TextBox 3">
@@ -7402,7 +7882,7 @@
 </p:sld>
 </file>
 
-<file path=ppt/slides/slide18.xml><?xml version="1.0" encoding="utf-8"?>
+<file path=ppt/slides/slide19.xml><?xml version="1.0" encoding="utf-8"?>
 <p:sld xmlns:a="http://schemas.openxmlformats.org/drawingml/2006/main" xmlns:r="http://schemas.openxmlformats.org/officeDocument/2006/relationships" xmlns:p="http://schemas.openxmlformats.org/presentationml/2006/main">
   <p:cSld>
     <p:spTree>
@@ -7486,187 +7966,10 @@
           </a:p>
         </p:txBody>
       </p:sp>
-      <p:sp>
-        <p:nvSpPr>
-          <p:cNvPr id="5" name="TextBox 4">
-            <a:extLst>
-              <a:ext uri="{FF2B5EF4-FFF2-40B4-BE49-F238E27FC236}">
-                <a16:creationId xmlns:a16="http://schemas.microsoft.com/office/drawing/2014/main" id="{9B3BF35D-8FB0-E04B-A720-5E1FEE085E28}"/>
-              </a:ext>
-            </a:extLst>
-          </p:cNvPr>
-          <p:cNvSpPr txBox="1"/>
-          <p:nvPr/>
-        </p:nvSpPr>
-        <p:spPr>
-          <a:xfrm>
-            <a:off x="7436224" y="4972967"/>
-            <a:ext cx="3550023" cy="646331"/>
-          </a:xfrm>
-          <a:prstGeom prst="rect">
-            <a:avLst/>
-          </a:prstGeom>
-          <a:noFill/>
-        </p:spPr>
-        <p:txBody>
-          <a:bodyPr wrap="square" rtlCol="0">
-            <a:spAutoFit/>
-          </a:bodyPr>
-          <a:lstStyle/>
-          <a:p>
-            <a:r>
-              <a:rPr lang="en-US" sz="3600" dirty="0"/>
-              <a:t>…and it scales!</a:t>
-            </a:r>
-          </a:p>
-        </p:txBody>
-      </p:sp>
     </p:spTree>
     <p:extLst>
       <p:ext uri="{BB962C8B-B14F-4D97-AF65-F5344CB8AC3E}">
         <p14:creationId xmlns:p14="http://schemas.microsoft.com/office/powerpoint/2010/main" val="1328096171"/>
-      </p:ext>
-    </p:extLst>
-  </p:cSld>
-  <p:clrMapOvr>
-    <a:masterClrMapping/>
-  </p:clrMapOvr>
-</p:sld>
-</file>
-
-<file path=ppt/slides/slide19.xml><?xml version="1.0" encoding="utf-8"?>
-<p:sld xmlns:a="http://schemas.openxmlformats.org/drawingml/2006/main" xmlns:r="http://schemas.openxmlformats.org/officeDocument/2006/relationships" xmlns:p="http://schemas.openxmlformats.org/presentationml/2006/main">
-  <p:cSld>
-    <p:spTree>
-      <p:nvGrpSpPr>
-        <p:cNvPr id="1" name=""/>
-        <p:cNvGrpSpPr/>
-        <p:nvPr/>
-      </p:nvGrpSpPr>
-      <p:grpSpPr>
-        <a:xfrm>
-          <a:off x="0" y="0"/>
-          <a:ext cx="0" cy="0"/>
-          <a:chOff x="0" y="0"/>
-          <a:chExt cx="0" cy="0"/>
-        </a:xfrm>
-      </p:grpSpPr>
-      <p:sp>
-        <p:nvSpPr>
-          <p:cNvPr id="2" name="Title 1">
-            <a:extLst>
-              <a:ext uri="{FF2B5EF4-FFF2-40B4-BE49-F238E27FC236}">
-                <a16:creationId xmlns:a16="http://schemas.microsoft.com/office/drawing/2014/main" id="{ED673EF7-D3E4-B143-8197-51689486E12A}"/>
-              </a:ext>
-            </a:extLst>
-          </p:cNvPr>
-          <p:cNvSpPr>
-            <a:spLocks noGrp="1"/>
-          </p:cNvSpPr>
-          <p:nvPr>
-            <p:ph type="title"/>
-          </p:nvPr>
-        </p:nvSpPr>
-        <p:spPr>
-          <a:xfrm>
-            <a:off x="1559429" y="410616"/>
-            <a:ext cx="9073141" cy="1143200"/>
-          </a:xfrm>
-        </p:spPr>
-        <p:txBody>
-          <a:bodyPr/>
-          <a:lstStyle/>
-          <a:p>
-            <a:pPr algn="ctr"/>
-            <a:r>
-              <a:rPr lang="en-US" sz="5400" dirty="0">
-                <a:latin typeface="+mj-lt"/>
-              </a:rPr>
-              <a:t>W.R.T. Transformers</a:t>
-            </a:r>
-          </a:p>
-        </p:txBody>
-      </p:sp>
-      <p:sp>
-        <p:nvSpPr>
-          <p:cNvPr id="3" name="Text Placeholder 2">
-            <a:extLst>
-              <a:ext uri="{FF2B5EF4-FFF2-40B4-BE49-F238E27FC236}">
-                <a16:creationId xmlns:a16="http://schemas.microsoft.com/office/drawing/2014/main" id="{B708A034-1435-4642-A728-9A5CB6C0AA56}"/>
-              </a:ext>
-            </a:extLst>
-          </p:cNvPr>
-          <p:cNvSpPr>
-            <a:spLocks noGrp="1"/>
-          </p:cNvSpPr>
-          <p:nvPr>
-            <p:ph type="body" idx="1"/>
-          </p:nvPr>
-        </p:nvSpPr>
-        <p:spPr>
-          <a:xfrm>
-            <a:off x="1787599" y="1553816"/>
-            <a:ext cx="8616800" cy="4736400"/>
-          </a:xfrm>
-        </p:spPr>
-        <p:txBody>
-          <a:bodyPr/>
-          <a:lstStyle/>
-          <a:p>
-            <a:pPr marL="152396" indent="0">
-              <a:buNone/>
-            </a:pPr>
-            <a:r>
-              <a:rPr lang="en-US" sz="3200" dirty="0">
-                <a:latin typeface="+mn-lt"/>
-              </a:rPr>
-              <a:t>Neural networks can generate word embeddings through back-prop</a:t>
-            </a:r>
-          </a:p>
-          <a:p>
-            <a:pPr marL="152396" indent="0">
-              <a:buNone/>
-            </a:pPr>
-            <a:endParaRPr lang="en-US" sz="3200" dirty="0">
-              <a:latin typeface="+mn-lt"/>
-            </a:endParaRPr>
-          </a:p>
-          <a:p>
-            <a:pPr marL="152396" indent="0">
-              <a:buNone/>
-            </a:pPr>
-            <a:r>
-              <a:rPr lang="en-US" sz="3200" dirty="0">
-                <a:latin typeface="+mn-lt"/>
-              </a:rPr>
-              <a:t>Masked language modeling is a lot like CBOW.</a:t>
-            </a:r>
-          </a:p>
-          <a:p>
-            <a:pPr marL="152396" indent="0">
-              <a:buNone/>
-            </a:pPr>
-            <a:endParaRPr lang="en-US" sz="3200" dirty="0">
-              <a:latin typeface="+mn-lt"/>
-            </a:endParaRPr>
-          </a:p>
-          <a:p>
-            <a:pPr marL="152396" indent="0">
-              <a:buNone/>
-            </a:pPr>
-            <a:r>
-              <a:rPr lang="en-US" sz="3200" dirty="0">
-                <a:latin typeface="+mn-lt"/>
-              </a:rPr>
-              <a:t>Transformers rely on distributional semantics, so they share many of the same problems as word2vec</a:t>
-            </a:r>
-          </a:p>
-        </p:txBody>
-      </p:sp>
-    </p:spTree>
-    <p:extLst>
-      <p:ext uri="{BB962C8B-B14F-4D97-AF65-F5344CB8AC3E}">
-        <p14:creationId xmlns:p14="http://schemas.microsoft.com/office/powerpoint/2010/main" val="4181980232"/>
       </p:ext>
     </p:extLst>
   </p:cSld>
@@ -7763,7 +8066,7 @@
             </a:pPr>
             <a:r>
               <a:rPr lang="en-US" sz="2400" dirty="0"/>
-              <a:t>Published by Google researchers in 2019</a:t>
+              <a:t>Published by Google researchers in 2013</a:t>
             </a:r>
           </a:p>
           <a:p>
@@ -7858,6 +8161,148 @@
           <p:cNvPr id="2" name="Title 1">
             <a:extLst>
               <a:ext uri="{FF2B5EF4-FFF2-40B4-BE49-F238E27FC236}">
+                <a16:creationId xmlns:a16="http://schemas.microsoft.com/office/drawing/2014/main" id="{ED673EF7-D3E4-B143-8197-51689486E12A}"/>
+              </a:ext>
+            </a:extLst>
+          </p:cNvPr>
+          <p:cNvSpPr>
+            <a:spLocks noGrp="1"/>
+          </p:cNvSpPr>
+          <p:nvPr>
+            <p:ph type="title"/>
+          </p:nvPr>
+        </p:nvSpPr>
+        <p:spPr>
+          <a:xfrm>
+            <a:off x="1559429" y="410616"/>
+            <a:ext cx="9073141" cy="1143200"/>
+          </a:xfrm>
+        </p:spPr>
+        <p:txBody>
+          <a:bodyPr/>
+          <a:lstStyle/>
+          <a:p>
+            <a:pPr algn="ctr"/>
+            <a:r>
+              <a:rPr lang="en-US" sz="5400" dirty="0">
+                <a:latin typeface="+mj-lt"/>
+              </a:rPr>
+              <a:t>W.R.T. Transformers</a:t>
+            </a:r>
+          </a:p>
+        </p:txBody>
+      </p:sp>
+      <p:sp>
+        <p:nvSpPr>
+          <p:cNvPr id="3" name="Text Placeholder 2">
+            <a:extLst>
+              <a:ext uri="{FF2B5EF4-FFF2-40B4-BE49-F238E27FC236}">
+                <a16:creationId xmlns:a16="http://schemas.microsoft.com/office/drawing/2014/main" id="{B708A034-1435-4642-A728-9A5CB6C0AA56}"/>
+              </a:ext>
+            </a:extLst>
+          </p:cNvPr>
+          <p:cNvSpPr>
+            <a:spLocks noGrp="1"/>
+          </p:cNvSpPr>
+          <p:nvPr>
+            <p:ph type="body" idx="1"/>
+          </p:nvPr>
+        </p:nvSpPr>
+        <p:spPr>
+          <a:xfrm>
+            <a:off x="1787599" y="1553816"/>
+            <a:ext cx="8616800" cy="4736400"/>
+          </a:xfrm>
+        </p:spPr>
+        <p:txBody>
+          <a:bodyPr/>
+          <a:lstStyle/>
+          <a:p>
+            <a:pPr marL="152396" indent="0">
+              <a:buNone/>
+            </a:pPr>
+            <a:r>
+              <a:rPr lang="en-US" sz="3200" dirty="0">
+                <a:latin typeface="+mn-lt"/>
+              </a:rPr>
+              <a:t>Neural networks still generate word embeddings through back-prop</a:t>
+            </a:r>
+          </a:p>
+          <a:p>
+            <a:pPr marL="152396" indent="0">
+              <a:buNone/>
+            </a:pPr>
+            <a:endParaRPr lang="en-US" sz="3200" dirty="0">
+              <a:latin typeface="+mn-lt"/>
+            </a:endParaRPr>
+          </a:p>
+          <a:p>
+            <a:pPr marL="152396" indent="0">
+              <a:buNone/>
+            </a:pPr>
+            <a:r>
+              <a:rPr lang="en-US" sz="3200" dirty="0">
+                <a:latin typeface="+mn-lt"/>
+              </a:rPr>
+              <a:t>Masked language modeling is a lot like CBOW.</a:t>
+            </a:r>
+          </a:p>
+          <a:p>
+            <a:pPr marL="152396" indent="0">
+              <a:buNone/>
+            </a:pPr>
+            <a:endParaRPr lang="en-US" sz="3200" dirty="0">
+              <a:latin typeface="+mn-lt"/>
+            </a:endParaRPr>
+          </a:p>
+          <a:p>
+            <a:pPr marL="152396" indent="0">
+              <a:buNone/>
+            </a:pPr>
+            <a:r>
+              <a:rPr lang="en-US" sz="3200" dirty="0">
+                <a:latin typeface="+mn-lt"/>
+              </a:rPr>
+              <a:t>Transformers rely on distributional semantics, so they share many of the same problems as word2vec</a:t>
+            </a:r>
+          </a:p>
+        </p:txBody>
+      </p:sp>
+    </p:spTree>
+    <p:extLst>
+      <p:ext uri="{BB962C8B-B14F-4D97-AF65-F5344CB8AC3E}">
+        <p14:creationId xmlns:p14="http://schemas.microsoft.com/office/powerpoint/2010/main" val="4181980232"/>
+      </p:ext>
+    </p:extLst>
+  </p:cSld>
+  <p:clrMapOvr>
+    <a:masterClrMapping/>
+  </p:clrMapOvr>
+</p:sld>
+</file>
+
+<file path=ppt/slides/slide21.xml><?xml version="1.0" encoding="utf-8"?>
+<p:sld xmlns:a="http://schemas.openxmlformats.org/drawingml/2006/main" xmlns:r="http://schemas.openxmlformats.org/officeDocument/2006/relationships" xmlns:p="http://schemas.openxmlformats.org/presentationml/2006/main">
+  <p:cSld>
+    <p:spTree>
+      <p:nvGrpSpPr>
+        <p:cNvPr id="1" name=""/>
+        <p:cNvGrpSpPr/>
+        <p:nvPr/>
+      </p:nvGrpSpPr>
+      <p:grpSpPr>
+        <a:xfrm>
+          <a:off x="0" y="0"/>
+          <a:ext cx="0" cy="0"/>
+          <a:chOff x="0" y="0"/>
+          <a:chExt cx="0" cy="0"/>
+        </a:xfrm>
+      </p:grpSpPr>
+      <p:sp>
+        <p:nvSpPr>
+          <p:cNvPr id="2" name="Title 1">
+            <a:extLst>
+              <a:ext uri="{FF2B5EF4-FFF2-40B4-BE49-F238E27FC236}">
                 <a16:creationId xmlns:a16="http://schemas.microsoft.com/office/drawing/2014/main" id="{BB6176CC-A0E2-1D4B-8E1F-8E784693D0F2}"/>
               </a:ext>
             </a:extLst>
@@ -8190,6 +8635,84 @@
   <p:clrMapOvr>
     <a:masterClrMapping/>
   </p:clrMapOvr>
+  <p:timing>
+    <p:tnLst>
+      <p:par>
+        <p:cTn id="1" dur="indefinite" restart="never" nodeType="tmRoot">
+          <p:childTnLst>
+            <p:seq concurrent="1" nextAc="seek">
+              <p:cTn id="2" dur="indefinite" nodeType="mainSeq">
+                <p:childTnLst>
+                  <p:par>
+                    <p:cTn id="3" fill="hold">
+                      <p:stCondLst>
+                        <p:cond delay="indefinite"/>
+                      </p:stCondLst>
+                      <p:childTnLst>
+                        <p:par>
+                          <p:cTn id="4" fill="hold">
+                            <p:stCondLst>
+                              <p:cond delay="0"/>
+                            </p:stCondLst>
+                            <p:childTnLst>
+                              <p:par>
+                                <p:cTn id="5" presetID="1" presetClass="entr" presetSubtype="0" fill="hold" grpId="0" nodeType="clickEffect">
+                                  <p:stCondLst>
+                                    <p:cond delay="0"/>
+                                  </p:stCondLst>
+                                  <p:childTnLst>
+                                    <p:set>
+                                      <p:cBhvr>
+                                        <p:cTn id="6" dur="1" fill="hold">
+                                          <p:stCondLst>
+                                            <p:cond delay="0"/>
+                                          </p:stCondLst>
+                                        </p:cTn>
+                                        <p:tgtEl>
+                                          <p:spTgt spid="3"/>
+                                        </p:tgtEl>
+                                        <p:attrNameLst>
+                                          <p:attrName>style.visibility</p:attrName>
+                                        </p:attrNameLst>
+                                      </p:cBhvr>
+                                      <p:to>
+                                        <p:strVal val="visible"/>
+                                      </p:to>
+                                    </p:set>
+                                  </p:childTnLst>
+                                </p:cTn>
+                              </p:par>
+                            </p:childTnLst>
+                          </p:cTn>
+                        </p:par>
+                      </p:childTnLst>
+                    </p:cTn>
+                  </p:par>
+                </p:childTnLst>
+              </p:cTn>
+              <p:prevCondLst>
+                <p:cond evt="onPrev" delay="0">
+                  <p:tgtEl>
+                    <p:sldTgt/>
+                  </p:tgtEl>
+                </p:cond>
+              </p:prevCondLst>
+              <p:nextCondLst>
+                <p:cond evt="onNext" delay="0">
+                  <p:tgtEl>
+                    <p:sldTgt/>
+                  </p:tgtEl>
+                </p:cond>
+              </p:nextCondLst>
+            </p:seq>
+          </p:childTnLst>
+        </p:cTn>
+      </p:par>
+    </p:tnLst>
+    <p:bldLst>
+      <p:bldP spid="3" grpId="0"/>
+    </p:bldLst>
+  </p:timing>
 </p:sld>
 </file>
 

</xml_diff>